<commit_message>
pptx - no ausbaufähig
</commit_message>
<xml_diff>
--- a/State-Of-The-Art Music Recommendation.pptx
+++ b/State-Of-The-Art Music Recommendation.pptx
@@ -7,9 +7,10 @@
   <p:sldIdLst>
     <p:sldId id="256" r:id="rId2"/>
     <p:sldId id="257" r:id="rId3"/>
-    <p:sldId id="259" r:id="rId4"/>
-    <p:sldId id="258" r:id="rId5"/>
-    <p:sldId id="260" r:id="rId6"/>
+    <p:sldId id="261" r:id="rId4"/>
+    <p:sldId id="259" r:id="rId5"/>
+    <p:sldId id="258" r:id="rId6"/>
+    <p:sldId id="260" r:id="rId7"/>
   </p:sldIdLst>
   <p:sldSz cx="12192000" cy="6858000"/>
   <p:notesSz cx="6858000" cy="9144000"/>
@@ -108,6 +109,11 @@
       </a:defRPr>
     </a:lvl9pPr>
   </p:defaultTextStyle>
+  <p:extLst>
+    <p:ext uri="{EFAFB233-063F-42B5-8137-9DF3F51BA10A}">
+      <p15:sldGuideLst xmlns:p15="http://schemas.microsoft.com/office/powerpoint/2012/main"/>
+    </p:ext>
+  </p:extLst>
 </p:presentation>
 </file>
 
@@ -260,7 +266,7 @@
           <a:p>
             <a:fld id="{199604B4-0E87-47C9-87F9-9EAF64B51BB5}" type="datetimeFigureOut">
               <a:rPr lang="de-AT" smtClean="0"/>
-              <a:t>03.06.2024</a:t>
+              <a:t>04.06.24</a:t>
             </a:fld>
             <a:endParaRPr lang="de-AT"/>
           </a:p>
@@ -460,7 +466,7 @@
           <a:p>
             <a:fld id="{199604B4-0E87-47C9-87F9-9EAF64B51BB5}" type="datetimeFigureOut">
               <a:rPr lang="de-AT" smtClean="0"/>
-              <a:t>03.06.2024</a:t>
+              <a:t>04.06.24</a:t>
             </a:fld>
             <a:endParaRPr lang="de-AT"/>
           </a:p>
@@ -670,7 +676,7 @@
           <a:p>
             <a:fld id="{199604B4-0E87-47C9-87F9-9EAF64B51BB5}" type="datetimeFigureOut">
               <a:rPr lang="de-AT" smtClean="0"/>
-              <a:t>03.06.2024</a:t>
+              <a:t>04.06.24</a:t>
             </a:fld>
             <a:endParaRPr lang="de-AT"/>
           </a:p>
@@ -870,7 +876,7 @@
           <a:p>
             <a:fld id="{199604B4-0E87-47C9-87F9-9EAF64B51BB5}" type="datetimeFigureOut">
               <a:rPr lang="de-AT" smtClean="0"/>
-              <a:t>03.06.2024</a:t>
+              <a:t>04.06.24</a:t>
             </a:fld>
             <a:endParaRPr lang="de-AT"/>
           </a:p>
@@ -1146,7 +1152,7 @@
           <a:p>
             <a:fld id="{199604B4-0E87-47C9-87F9-9EAF64B51BB5}" type="datetimeFigureOut">
               <a:rPr lang="de-AT" smtClean="0"/>
-              <a:t>03.06.2024</a:t>
+              <a:t>04.06.24</a:t>
             </a:fld>
             <a:endParaRPr lang="de-AT"/>
           </a:p>
@@ -1414,7 +1420,7 @@
           <a:p>
             <a:fld id="{199604B4-0E87-47C9-87F9-9EAF64B51BB5}" type="datetimeFigureOut">
               <a:rPr lang="de-AT" smtClean="0"/>
-              <a:t>03.06.2024</a:t>
+              <a:t>04.06.24</a:t>
             </a:fld>
             <a:endParaRPr lang="de-AT"/>
           </a:p>
@@ -1829,7 +1835,7 @@
           <a:p>
             <a:fld id="{199604B4-0E87-47C9-87F9-9EAF64B51BB5}" type="datetimeFigureOut">
               <a:rPr lang="de-AT" smtClean="0"/>
-              <a:t>03.06.2024</a:t>
+              <a:t>04.06.24</a:t>
             </a:fld>
             <a:endParaRPr lang="de-AT"/>
           </a:p>
@@ -1971,7 +1977,7 @@
           <a:p>
             <a:fld id="{199604B4-0E87-47C9-87F9-9EAF64B51BB5}" type="datetimeFigureOut">
               <a:rPr lang="de-AT" smtClean="0"/>
-              <a:t>03.06.2024</a:t>
+              <a:t>04.06.24</a:t>
             </a:fld>
             <a:endParaRPr lang="de-AT"/>
           </a:p>
@@ -2084,7 +2090,7 @@
           <a:p>
             <a:fld id="{199604B4-0E87-47C9-87F9-9EAF64B51BB5}" type="datetimeFigureOut">
               <a:rPr lang="de-AT" smtClean="0"/>
-              <a:t>03.06.2024</a:t>
+              <a:t>04.06.24</a:t>
             </a:fld>
             <a:endParaRPr lang="de-AT"/>
           </a:p>
@@ -2397,7 +2403,7 @@
           <a:p>
             <a:fld id="{199604B4-0E87-47C9-87F9-9EAF64B51BB5}" type="datetimeFigureOut">
               <a:rPr lang="de-AT" smtClean="0"/>
-              <a:t>03.06.2024</a:t>
+              <a:t>04.06.24</a:t>
             </a:fld>
             <a:endParaRPr lang="de-AT"/>
           </a:p>
@@ -2686,7 +2692,7 @@
           <a:p>
             <a:fld id="{199604B4-0E87-47C9-87F9-9EAF64B51BB5}" type="datetimeFigureOut">
               <a:rPr lang="de-AT" smtClean="0"/>
-              <a:t>03.06.2024</a:t>
+              <a:t>04.06.24</a:t>
             </a:fld>
             <a:endParaRPr lang="de-AT"/>
           </a:p>
@@ -2929,7 +2935,7 @@
           <a:p>
             <a:fld id="{199604B4-0E87-47C9-87F9-9EAF64B51BB5}" type="datetimeFigureOut">
               <a:rPr lang="de-AT" smtClean="0"/>
-              <a:t>03.06.2024</a:t>
+              <a:t>04.06.24</a:t>
             </a:fld>
             <a:endParaRPr lang="de-AT"/>
           </a:p>
@@ -3332,6 +3338,14 @@
 <file path=ppt/slides/slide1.xml><?xml version="1.0" encoding="utf-8"?>
 <p:sld xmlns:a="http://schemas.openxmlformats.org/drawingml/2006/main" xmlns:r="http://schemas.openxmlformats.org/officeDocument/2006/relationships" xmlns:p="http://schemas.openxmlformats.org/presentationml/2006/main">
   <p:cSld>
+    <p:bg>
+      <p:bgPr>
+        <a:solidFill>
+          <a:schemeClr val="bg1"/>
+        </a:solidFill>
+        <a:effectLst/>
+      </p:bgPr>
+    </p:bg>
     <p:spTree>
       <p:nvGrpSpPr>
         <p:cNvPr id="1" name=""/>
@@ -3346,6 +3360,195 @@
           <a:chExt cx="0" cy="0"/>
         </a:xfrm>
       </p:grpSpPr>
+      <p:sp useBgFill="1">
+        <p:nvSpPr>
+          <p:cNvPr id="8" name="Rectangle 7">
+            <a:extLst>
+              <a:ext uri="{FF2B5EF4-FFF2-40B4-BE49-F238E27FC236}">
+                <a16:creationId xmlns:a16="http://schemas.microsoft.com/office/drawing/2014/main" id="{934F1179-B481-4F9E-BCA3-AFB972070F83}"/>
+              </a:ext>
+              <a:ext uri="{C183D7F6-B498-43B3-948B-1728B52AA6E4}">
+                <adec:decorative xmlns:adec="http://schemas.microsoft.com/office/drawing/2017/decorative" val="1"/>
+              </a:ext>
+            </a:extLst>
+          </p:cNvPr>
+          <p:cNvSpPr>
+            <a:spLocks noGrp="1" noRot="1" noChangeAspect="1" noMove="1" noResize="1" noEditPoints="1" noAdjustHandles="1" noChangeArrowheads="1" noChangeShapeType="1" noTextEdit="1"/>
+          </p:cNvSpPr>
+          <p:nvPr>
+            <p:extLst>
+              <p:ext uri="{386F3935-93C4-4BCD-93E2-E3B085C9AB24}">
+                <p16:designElem xmlns:p16="http://schemas.microsoft.com/office/powerpoint/2015/main" val="1"/>
+              </p:ext>
+            </p:extLst>
+          </p:nvPr>
+        </p:nvSpPr>
+        <p:spPr>
+          <a:xfrm>
+            <a:off x="0" y="0"/>
+            <a:ext cx="12192000" cy="6858000"/>
+          </a:xfrm>
+          <a:prstGeom prst="rect">
+            <a:avLst/>
+          </a:prstGeom>
+          <a:ln>
+            <a:noFill/>
+          </a:ln>
+        </p:spPr>
+        <p:style>
+          <a:lnRef idx="2">
+            <a:schemeClr val="accent1">
+              <a:shade val="50000"/>
+            </a:schemeClr>
+          </a:lnRef>
+          <a:fillRef idx="1">
+            <a:schemeClr val="accent1"/>
+          </a:fillRef>
+          <a:effectRef idx="0">
+            <a:schemeClr val="accent1"/>
+          </a:effectRef>
+          <a:fontRef idx="minor">
+            <a:schemeClr val="lt1"/>
+          </a:fontRef>
+        </p:style>
+        <p:txBody>
+          <a:bodyPr rtlCol="0" anchor="ctr"/>
+          <a:lstStyle/>
+          <a:p>
+            <a:pPr algn="ctr"/>
+            <a:endParaRPr lang="en-US"/>
+          </a:p>
+        </p:txBody>
+      </p:sp>
+      <p:sp>
+        <p:nvSpPr>
+          <p:cNvPr id="10" name="Right Triangle 9">
+            <a:extLst>
+              <a:ext uri="{FF2B5EF4-FFF2-40B4-BE49-F238E27FC236}">
+                <a16:creationId xmlns:a16="http://schemas.microsoft.com/office/drawing/2014/main" id="{827DC2C4-B485-428A-BF4A-472D2967F47F}"/>
+              </a:ext>
+              <a:ext uri="{C183D7F6-B498-43B3-948B-1728B52AA6E4}">
+                <adec:decorative xmlns:adec="http://schemas.microsoft.com/office/drawing/2017/decorative" val="1"/>
+              </a:ext>
+            </a:extLst>
+          </p:cNvPr>
+          <p:cNvSpPr>
+            <a:spLocks noGrp="1" noRot="1" noChangeAspect="1" noMove="1" noResize="1" noEditPoints="1" noAdjustHandles="1" noChangeArrowheads="1" noChangeShapeType="1" noTextEdit="1"/>
+          </p:cNvSpPr>
+          <p:nvPr>
+            <p:extLst>
+              <p:ext uri="{386F3935-93C4-4BCD-93E2-E3B085C9AB24}">
+                <p16:designElem xmlns:p16="http://schemas.microsoft.com/office/powerpoint/2015/main" val="1"/>
+              </p:ext>
+            </p:extLst>
+          </p:nvPr>
+        </p:nvSpPr>
+        <p:spPr>
+          <a:xfrm flipH="1">
+            <a:off x="8576720" y="3335867"/>
+            <a:ext cx="3291840" cy="3200400"/>
+          </a:xfrm>
+          <a:prstGeom prst="rtTriangle">
+            <a:avLst/>
+          </a:prstGeom>
+          <a:solidFill>
+            <a:schemeClr val="accent4"/>
+          </a:solidFill>
+          <a:ln>
+            <a:noFill/>
+          </a:ln>
+        </p:spPr>
+        <p:style>
+          <a:lnRef idx="2">
+            <a:schemeClr val="accent1">
+              <a:shade val="50000"/>
+            </a:schemeClr>
+          </a:lnRef>
+          <a:fillRef idx="1">
+            <a:schemeClr val="accent1"/>
+          </a:fillRef>
+          <a:effectRef idx="0">
+            <a:schemeClr val="accent1"/>
+          </a:effectRef>
+          <a:fontRef idx="minor">
+            <a:schemeClr val="lt1"/>
+          </a:fontRef>
+        </p:style>
+        <p:txBody>
+          <a:bodyPr rtlCol="0" anchor="ctr"/>
+          <a:lstStyle/>
+          <a:p>
+            <a:pPr algn="ctr"/>
+            <a:endParaRPr lang="en-US" dirty="0"/>
+          </a:p>
+        </p:txBody>
+      </p:sp>
+      <p:sp>
+        <p:nvSpPr>
+          <p:cNvPr id="12" name="Rectangle 11">
+            <a:extLst>
+              <a:ext uri="{FF2B5EF4-FFF2-40B4-BE49-F238E27FC236}">
+                <a16:creationId xmlns:a16="http://schemas.microsoft.com/office/drawing/2014/main" id="{EE04B5EB-F158-4507-90DD-BD23620C7CC9}"/>
+              </a:ext>
+              <a:ext uri="{C183D7F6-B498-43B3-948B-1728B52AA6E4}">
+                <adec:decorative xmlns:adec="http://schemas.microsoft.com/office/drawing/2017/decorative" val="1"/>
+              </a:ext>
+            </a:extLst>
+          </p:cNvPr>
+          <p:cNvSpPr>
+            <a:spLocks noGrp="1" noRot="1" noChangeAspect="1" noMove="1" noResize="1" noEditPoints="1" noAdjustHandles="1" noChangeArrowheads="1" noChangeShapeType="1" noTextEdit="1"/>
+          </p:cNvSpPr>
+          <p:nvPr>
+            <p:extLst>
+              <p:ext uri="{386F3935-93C4-4BCD-93E2-E3B085C9AB24}">
+                <p16:designElem xmlns:p16="http://schemas.microsoft.com/office/powerpoint/2015/main" val="1"/>
+              </p:ext>
+            </p:extLst>
+          </p:nvPr>
+        </p:nvSpPr>
+        <p:spPr>
+          <a:xfrm>
+            <a:off x="641774" y="623275"/>
+            <a:ext cx="10905053" cy="5607882"/>
+          </a:xfrm>
+          <a:prstGeom prst="rect">
+            <a:avLst/>
+          </a:prstGeom>
+          <a:noFill/>
+          <a:ln w="19050">
+            <a:solidFill>
+              <a:schemeClr val="tx1">
+                <a:lumMod val="75000"/>
+                <a:lumOff val="25000"/>
+              </a:schemeClr>
+            </a:solidFill>
+          </a:ln>
+        </p:spPr>
+        <p:style>
+          <a:lnRef idx="2">
+            <a:schemeClr val="accent1">
+              <a:shade val="50000"/>
+            </a:schemeClr>
+          </a:lnRef>
+          <a:fillRef idx="1">
+            <a:schemeClr val="accent1"/>
+          </a:fillRef>
+          <a:effectRef idx="0">
+            <a:schemeClr val="accent1"/>
+          </a:effectRef>
+          <a:fontRef idx="minor">
+            <a:schemeClr val="lt1"/>
+          </a:fontRef>
+        </p:style>
+        <p:txBody>
+          <a:bodyPr rtlCol="0" anchor="ctr"/>
+          <a:lstStyle/>
+          <a:p>
+            <a:pPr algn="ctr"/>
+            <a:endParaRPr lang="en-US"/>
+          </a:p>
+        </p:txBody>
+      </p:sp>
       <p:sp>
         <p:nvSpPr>
           <p:cNvPr id="2" name="Titel 1">
@@ -3362,28 +3565,36 @@
             <p:ph type="ctrTitle"/>
           </p:nvPr>
         </p:nvSpPr>
-        <p:spPr/>
-        <p:txBody>
-          <a:bodyPr/>
-          <a:lstStyle/>
-          <a:p>
-            <a:r>
-              <a:rPr lang="de-AT" dirty="0"/>
+        <p:spPr>
+          <a:xfrm>
+            <a:off x="1285241" y="1008993"/>
+            <a:ext cx="9231410" cy="3542045"/>
+          </a:xfrm>
+        </p:spPr>
+        <p:txBody>
+          <a:bodyPr anchor="b">
+            <a:normAutofit/>
+          </a:bodyPr>
+          <a:lstStyle/>
+          <a:p>
+            <a:pPr algn="l"/>
+            <a:r>
+              <a:rPr lang="de-AT" sz="8100" dirty="0"/>
               <a:t>State-</a:t>
             </a:r>
             <a:r>
-              <a:rPr lang="de-AT" dirty="0" err="1"/>
+              <a:rPr lang="de-AT" sz="8100" dirty="0" err="1"/>
               <a:t>Of</a:t>
             </a:r>
             <a:r>
-              <a:rPr lang="de-AT" dirty="0"/>
+              <a:rPr lang="de-AT" sz="8100" dirty="0"/>
               <a:t>-The-Art Music </a:t>
             </a:r>
             <a:r>
-              <a:rPr lang="de-AT" dirty="0" err="1"/>
+              <a:rPr lang="de-AT" sz="8100" dirty="0" err="1"/>
               <a:t>Recommendation</a:t>
             </a:r>
-            <a:endParaRPr lang="de-AT" dirty="0"/>
+            <a:endParaRPr lang="de-AT" sz="8100" dirty="0"/>
           </a:p>
         </p:txBody>
       </p:sp>
@@ -3403,17 +3614,27 @@
             <p:ph type="subTitle" idx="1"/>
           </p:nvPr>
         </p:nvSpPr>
-        <p:spPr/>
-        <p:txBody>
-          <a:bodyPr/>
-          <a:lstStyle/>
-          <a:p>
+        <p:spPr>
+          <a:xfrm>
+            <a:off x="1285241" y="4582814"/>
+            <a:ext cx="7132335" cy="1312657"/>
+          </a:xfrm>
+        </p:spPr>
+        <p:txBody>
+          <a:bodyPr anchor="t">
+            <a:normAutofit/>
+          </a:bodyPr>
+          <a:lstStyle/>
+          <a:p>
+            <a:pPr algn="l"/>
             <a:r>
               <a:rPr lang="de-AT" dirty="0"/>
               <a:t>Seminar Paper</a:t>
             </a:r>
-          </a:p>
-          <a:p>
+            <a:endParaRPr lang="de-AT"/>
+          </a:p>
+          <a:p>
+            <a:pPr algn="l"/>
             <a:r>
               <a:rPr lang="de-AT" dirty="0"/>
               <a:t>Katharina </a:t>
@@ -3422,7 +3643,7 @@
               <a:rPr lang="de-AT" dirty="0" err="1"/>
               <a:t>Stengg</a:t>
             </a:r>
-            <a:endParaRPr lang="de-AT" dirty="0"/>
+            <a:endParaRPr lang="de-AT"/>
           </a:p>
         </p:txBody>
       </p:sp>
@@ -3442,6 +3663,14 @@
 <file path=ppt/slides/slide2.xml><?xml version="1.0" encoding="utf-8"?>
 <p:sld xmlns:a="http://schemas.openxmlformats.org/drawingml/2006/main" xmlns:r="http://schemas.openxmlformats.org/officeDocument/2006/relationships" xmlns:p="http://schemas.openxmlformats.org/presentationml/2006/main">
   <p:cSld>
+    <p:bg>
+      <p:bgPr>
+        <a:solidFill>
+          <a:schemeClr val="bg1"/>
+        </a:solidFill>
+        <a:effectLst/>
+      </p:bgPr>
+    </p:bg>
     <p:spTree>
       <p:nvGrpSpPr>
         <p:cNvPr id="1" name=""/>
@@ -3456,6 +3685,382 @@
           <a:chExt cx="0" cy="0"/>
         </a:xfrm>
       </p:grpSpPr>
+      <p:sp useBgFill="1">
+        <p:nvSpPr>
+          <p:cNvPr id="8" name="Rectangle 7">
+            <a:extLst>
+              <a:ext uri="{FF2B5EF4-FFF2-40B4-BE49-F238E27FC236}">
+                <a16:creationId xmlns:a16="http://schemas.microsoft.com/office/drawing/2014/main" id="{081EA652-8C6A-4E69-BEB9-170809474553}"/>
+              </a:ext>
+              <a:ext uri="{C183D7F6-B498-43B3-948B-1728B52AA6E4}">
+                <adec:decorative xmlns:adec="http://schemas.microsoft.com/office/drawing/2017/decorative" val="1"/>
+              </a:ext>
+            </a:extLst>
+          </p:cNvPr>
+          <p:cNvSpPr>
+            <a:spLocks noGrp="1" noRot="1" noChangeAspect="1" noMove="1" noResize="1" noEditPoints="1" noAdjustHandles="1" noChangeArrowheads="1" noChangeShapeType="1" noTextEdit="1"/>
+          </p:cNvSpPr>
+          <p:nvPr>
+            <p:extLst>
+              <p:ext uri="{386F3935-93C4-4BCD-93E2-E3B085C9AB24}">
+                <p16:designElem xmlns:p16="http://schemas.microsoft.com/office/powerpoint/2015/main" val="1"/>
+              </p:ext>
+            </p:extLst>
+          </p:nvPr>
+        </p:nvSpPr>
+        <p:spPr>
+          <a:xfrm>
+            <a:off x="0" y="0"/>
+            <a:ext cx="12192000" cy="6858000"/>
+          </a:xfrm>
+          <a:prstGeom prst="rect">
+            <a:avLst/>
+          </a:prstGeom>
+          <a:ln>
+            <a:noFill/>
+          </a:ln>
+        </p:spPr>
+        <p:style>
+          <a:lnRef idx="2">
+            <a:schemeClr val="accent1">
+              <a:shade val="50000"/>
+            </a:schemeClr>
+          </a:lnRef>
+          <a:fillRef idx="1">
+            <a:schemeClr val="accent1"/>
+          </a:fillRef>
+          <a:effectRef idx="0">
+            <a:schemeClr val="accent1"/>
+          </a:effectRef>
+          <a:fontRef idx="minor">
+            <a:schemeClr val="lt1"/>
+          </a:fontRef>
+        </p:style>
+        <p:txBody>
+          <a:bodyPr rtlCol="0" anchor="ctr"/>
+          <a:lstStyle/>
+          <a:p>
+            <a:pPr algn="ctr"/>
+            <a:endParaRPr lang="en-US"/>
+          </a:p>
+        </p:txBody>
+      </p:sp>
+      <p:sp>
+        <p:nvSpPr>
+          <p:cNvPr id="10" name="Freeform: Shape 9">
+            <a:extLst>
+              <a:ext uri="{FF2B5EF4-FFF2-40B4-BE49-F238E27FC236}">
+                <a16:creationId xmlns:a16="http://schemas.microsoft.com/office/drawing/2014/main" id="{A4026A73-1F7F-49F2-B319-8CA3B3D53269}"/>
+              </a:ext>
+              <a:ext uri="{C183D7F6-B498-43B3-948B-1728B52AA6E4}">
+                <adec:decorative xmlns:adec="http://schemas.microsoft.com/office/drawing/2017/decorative" val="1"/>
+              </a:ext>
+            </a:extLst>
+          </p:cNvPr>
+          <p:cNvSpPr>
+            <a:spLocks noGrp="1" noRot="1" noChangeAspect="1" noMove="1" noResize="1" noEditPoints="1" noAdjustHandles="1" noChangeArrowheads="1" noChangeShapeType="1" noTextEdit="1"/>
+          </p:cNvSpPr>
+          <p:nvPr>
+            <p:extLst>
+              <p:ext uri="{386F3935-93C4-4BCD-93E2-E3B085C9AB24}">
+                <p16:designElem xmlns:p16="http://schemas.microsoft.com/office/powerpoint/2015/main" val="1"/>
+              </p:ext>
+            </p:extLst>
+          </p:nvPr>
+        </p:nvSpPr>
+        <p:spPr>
+          <a:xfrm>
+            <a:off x="321732" y="321733"/>
+            <a:ext cx="11546828" cy="6214534"/>
+          </a:xfrm>
+          <a:custGeom>
+            <a:avLst/>
+            <a:gdLst>
+              <a:gd name="connsiteX0" fmla="*/ 0 w 11546828"/>
+              <a:gd name="connsiteY0" fmla="*/ 0 h 6214534"/>
+              <a:gd name="connsiteX1" fmla="*/ 7965430 w 11546828"/>
+              <a:gd name="connsiteY1" fmla="*/ 0 h 6214534"/>
+              <a:gd name="connsiteX2" fmla="*/ 7965430 w 11546828"/>
+              <a:gd name="connsiteY2" fmla="*/ 1786 h 6214534"/>
+              <a:gd name="connsiteX3" fmla="*/ 11546828 w 11546828"/>
+              <a:gd name="connsiteY3" fmla="*/ 1786 h 6214534"/>
+              <a:gd name="connsiteX4" fmla="*/ 11546828 w 11546828"/>
+              <a:gd name="connsiteY4" fmla="*/ 2866740 h 6214534"/>
+              <a:gd name="connsiteX5" fmla="*/ 11225095 w 11546828"/>
+              <a:gd name="connsiteY5" fmla="*/ 3179536 h 6214534"/>
+              <a:gd name="connsiteX6" fmla="*/ 11225095 w 11546828"/>
+              <a:gd name="connsiteY6" fmla="*/ 301542 h 6214534"/>
+              <a:gd name="connsiteX7" fmla="*/ 320042 w 11546828"/>
+              <a:gd name="connsiteY7" fmla="*/ 301542 h 6214534"/>
+              <a:gd name="connsiteX8" fmla="*/ 320042 w 11546828"/>
+              <a:gd name="connsiteY8" fmla="*/ 5909424 h 6214534"/>
+              <a:gd name="connsiteX9" fmla="*/ 8417210 w 11546828"/>
+              <a:gd name="connsiteY9" fmla="*/ 5909424 h 6214534"/>
+              <a:gd name="connsiteX10" fmla="*/ 8103383 w 11546828"/>
+              <a:gd name="connsiteY10" fmla="*/ 6214534 h 6214534"/>
+              <a:gd name="connsiteX11" fmla="*/ 7222929 w 11546828"/>
+              <a:gd name="connsiteY11" fmla="*/ 6214534 h 6214534"/>
+              <a:gd name="connsiteX12" fmla="*/ 7222929 w 11546828"/>
+              <a:gd name="connsiteY12" fmla="*/ 6212748 h 6214534"/>
+              <a:gd name="connsiteX13" fmla="*/ 0 w 11546828"/>
+              <a:gd name="connsiteY13" fmla="*/ 6212748 h 6214534"/>
+            </a:gdLst>
+            <a:ahLst/>
+            <a:cxnLst>
+              <a:cxn ang="0">
+                <a:pos x="connsiteX0" y="connsiteY0"/>
+              </a:cxn>
+              <a:cxn ang="0">
+                <a:pos x="connsiteX1" y="connsiteY1"/>
+              </a:cxn>
+              <a:cxn ang="0">
+                <a:pos x="connsiteX2" y="connsiteY2"/>
+              </a:cxn>
+              <a:cxn ang="0">
+                <a:pos x="connsiteX3" y="connsiteY3"/>
+              </a:cxn>
+              <a:cxn ang="0">
+                <a:pos x="connsiteX4" y="connsiteY4"/>
+              </a:cxn>
+              <a:cxn ang="0">
+                <a:pos x="connsiteX5" y="connsiteY5"/>
+              </a:cxn>
+              <a:cxn ang="0">
+                <a:pos x="connsiteX6" y="connsiteY6"/>
+              </a:cxn>
+              <a:cxn ang="0">
+                <a:pos x="connsiteX7" y="connsiteY7"/>
+              </a:cxn>
+              <a:cxn ang="0">
+                <a:pos x="connsiteX8" y="connsiteY8"/>
+              </a:cxn>
+              <a:cxn ang="0">
+                <a:pos x="connsiteX9" y="connsiteY9"/>
+              </a:cxn>
+              <a:cxn ang="0">
+                <a:pos x="connsiteX10" y="connsiteY10"/>
+              </a:cxn>
+              <a:cxn ang="0">
+                <a:pos x="connsiteX11" y="connsiteY11"/>
+              </a:cxn>
+              <a:cxn ang="0">
+                <a:pos x="connsiteX12" y="connsiteY12"/>
+              </a:cxn>
+              <a:cxn ang="0">
+                <a:pos x="connsiteX13" y="connsiteY13"/>
+              </a:cxn>
+            </a:cxnLst>
+            <a:rect l="l" t="t" r="r" b="b"/>
+            <a:pathLst>
+              <a:path w="11546828" h="6214534">
+                <a:moveTo>
+                  <a:pt x="0" y="0"/>
+                </a:moveTo>
+                <a:lnTo>
+                  <a:pt x="7965430" y="0"/>
+                </a:lnTo>
+                <a:lnTo>
+                  <a:pt x="7965430" y="1786"/>
+                </a:lnTo>
+                <a:lnTo>
+                  <a:pt x="11546828" y="1786"/>
+                </a:lnTo>
+                <a:lnTo>
+                  <a:pt x="11546828" y="2866740"/>
+                </a:lnTo>
+                <a:lnTo>
+                  <a:pt x="11225095" y="3179536"/>
+                </a:lnTo>
+                <a:lnTo>
+                  <a:pt x="11225095" y="301542"/>
+                </a:lnTo>
+                <a:lnTo>
+                  <a:pt x="320042" y="301542"/>
+                </a:lnTo>
+                <a:lnTo>
+                  <a:pt x="320042" y="5909424"/>
+                </a:lnTo>
+                <a:lnTo>
+                  <a:pt x="8417210" y="5909424"/>
+                </a:lnTo>
+                <a:lnTo>
+                  <a:pt x="8103383" y="6214534"/>
+                </a:lnTo>
+                <a:lnTo>
+                  <a:pt x="7222929" y="6214534"/>
+                </a:lnTo>
+                <a:lnTo>
+                  <a:pt x="7222929" y="6212748"/>
+                </a:lnTo>
+                <a:lnTo>
+                  <a:pt x="0" y="6212748"/>
+                </a:lnTo>
+                <a:close/>
+              </a:path>
+            </a:pathLst>
+          </a:custGeom>
+          <a:solidFill>
+            <a:schemeClr val="tx1">
+              <a:lumMod val="50000"/>
+              <a:lumOff val="50000"/>
+              <a:alpha val="25000"/>
+            </a:schemeClr>
+          </a:solidFill>
+          <a:ln>
+            <a:noFill/>
+          </a:ln>
+        </p:spPr>
+        <p:style>
+          <a:lnRef idx="2">
+            <a:schemeClr val="accent1">
+              <a:shade val="50000"/>
+            </a:schemeClr>
+          </a:lnRef>
+          <a:fillRef idx="1">
+            <a:schemeClr val="accent1"/>
+          </a:fillRef>
+          <a:effectRef idx="0">
+            <a:schemeClr val="accent1"/>
+          </a:effectRef>
+          <a:fontRef idx="minor">
+            <a:schemeClr val="lt1"/>
+          </a:fontRef>
+        </p:style>
+        <p:txBody>
+          <a:bodyPr wrap="square" rtlCol="0" anchor="ctr">
+            <a:noAutofit/>
+          </a:bodyPr>
+          <a:lstStyle/>
+          <a:p>
+            <a:pPr algn="ctr"/>
+            <a:endParaRPr lang="en-US"/>
+          </a:p>
+        </p:txBody>
+      </p:sp>
+      <p:sp>
+        <p:nvSpPr>
+          <p:cNvPr id="12" name="Right Triangle 11">
+            <a:extLst>
+              <a:ext uri="{FF2B5EF4-FFF2-40B4-BE49-F238E27FC236}">
+                <a16:creationId xmlns:a16="http://schemas.microsoft.com/office/drawing/2014/main" id="{5298780A-33B9-4EA2-8F67-DE68AD62841B}"/>
+              </a:ext>
+              <a:ext uri="{C183D7F6-B498-43B3-948B-1728B52AA6E4}">
+                <adec:decorative xmlns:adec="http://schemas.microsoft.com/office/drawing/2017/decorative" val="1"/>
+              </a:ext>
+            </a:extLst>
+          </p:cNvPr>
+          <p:cNvSpPr>
+            <a:spLocks noGrp="1" noRot="1" noChangeAspect="1" noMove="1" noResize="1" noEditPoints="1" noAdjustHandles="1" noChangeArrowheads="1" noChangeShapeType="1" noTextEdit="1"/>
+          </p:cNvSpPr>
+          <p:nvPr>
+            <p:extLst>
+              <p:ext uri="{386F3935-93C4-4BCD-93E2-E3B085C9AB24}">
+                <p16:designElem xmlns:p16="http://schemas.microsoft.com/office/powerpoint/2015/main" val="1"/>
+              </p:ext>
+            </p:extLst>
+          </p:nvPr>
+        </p:nvSpPr>
+        <p:spPr>
+          <a:xfrm flipH="1">
+            <a:off x="8576720" y="3335867"/>
+            <a:ext cx="3291840" cy="3200400"/>
+          </a:xfrm>
+          <a:prstGeom prst="rtTriangle">
+            <a:avLst/>
+          </a:prstGeom>
+          <a:solidFill>
+            <a:schemeClr val="accent4"/>
+          </a:solidFill>
+          <a:ln>
+            <a:noFill/>
+          </a:ln>
+        </p:spPr>
+        <p:style>
+          <a:lnRef idx="2">
+            <a:schemeClr val="accent1">
+              <a:shade val="50000"/>
+            </a:schemeClr>
+          </a:lnRef>
+          <a:fillRef idx="1">
+            <a:schemeClr val="accent1"/>
+          </a:fillRef>
+          <a:effectRef idx="0">
+            <a:schemeClr val="accent1"/>
+          </a:effectRef>
+          <a:fontRef idx="minor">
+            <a:schemeClr val="lt1"/>
+          </a:fontRef>
+        </p:style>
+        <p:txBody>
+          <a:bodyPr rtlCol="0" anchor="ctr"/>
+          <a:lstStyle/>
+          <a:p>
+            <a:pPr algn="ctr"/>
+            <a:endParaRPr lang="en-US" dirty="0"/>
+          </a:p>
+        </p:txBody>
+      </p:sp>
+      <p:sp>
+        <p:nvSpPr>
+          <p:cNvPr id="14" name="Rectangle 13">
+            <a:extLst>
+              <a:ext uri="{FF2B5EF4-FFF2-40B4-BE49-F238E27FC236}">
+                <a16:creationId xmlns:a16="http://schemas.microsoft.com/office/drawing/2014/main" id="{7F488E8B-4E1E-4402-8935-D4E6C02615C7}"/>
+              </a:ext>
+              <a:ext uri="{C183D7F6-B498-43B3-948B-1728B52AA6E4}">
+                <adec:decorative xmlns:adec="http://schemas.microsoft.com/office/drawing/2017/decorative" val="1"/>
+              </a:ext>
+            </a:extLst>
+          </p:cNvPr>
+          <p:cNvSpPr>
+            <a:spLocks noGrp="1" noRot="1" noChangeAspect="1" noMove="1" noResize="1" noEditPoints="1" noAdjustHandles="1" noChangeArrowheads="1" noChangeShapeType="1" noTextEdit="1"/>
+          </p:cNvSpPr>
+          <p:nvPr>
+            <p:extLst>
+              <p:ext uri="{386F3935-93C4-4BCD-93E2-E3B085C9AB24}">
+                <p16:designElem xmlns:p16="http://schemas.microsoft.com/office/powerpoint/2015/main" val="1"/>
+              </p:ext>
+            </p:extLst>
+          </p:nvPr>
+        </p:nvSpPr>
+        <p:spPr>
+          <a:xfrm>
+            <a:off x="641774" y="623275"/>
+            <a:ext cx="10905053" cy="5607882"/>
+          </a:xfrm>
+          <a:prstGeom prst="rect">
+            <a:avLst/>
+          </a:prstGeom>
+          <a:noFill/>
+          <a:ln w="19050">
+            <a:noFill/>
+          </a:ln>
+        </p:spPr>
+        <p:style>
+          <a:lnRef idx="2">
+            <a:schemeClr val="accent1">
+              <a:shade val="50000"/>
+            </a:schemeClr>
+          </a:lnRef>
+          <a:fillRef idx="1">
+            <a:schemeClr val="accent1"/>
+          </a:fillRef>
+          <a:effectRef idx="0">
+            <a:schemeClr val="accent1"/>
+          </a:effectRef>
+          <a:fontRef idx="minor">
+            <a:schemeClr val="lt1"/>
+          </a:fontRef>
+        </p:style>
+        <p:txBody>
+          <a:bodyPr rtlCol="0" anchor="ctr"/>
+          <a:lstStyle/>
+          <a:p>
+            <a:pPr algn="ctr"/>
+            <a:endParaRPr lang="en-US"/>
+          </a:p>
+        </p:txBody>
+      </p:sp>
       <p:sp>
         <p:nvSpPr>
           <p:cNvPr id="2" name="Titel 1">
@@ -3472,22 +4077,81 @@
             <p:ph type="title"/>
           </p:nvPr>
         </p:nvSpPr>
-        <p:spPr/>
-        <p:txBody>
-          <a:bodyPr/>
-          <a:lstStyle/>
-          <a:p>
-            <a:r>
-              <a:rPr lang="de-AT" dirty="0" err="1"/>
-              <a:t>Why</a:t>
-            </a:r>
-            <a:r>
-              <a:rPr lang="de-AT" dirty="0"/>
-              <a:t>?	</a:t>
-            </a:r>
-          </a:p>
-        </p:txBody>
-      </p:sp>
+        <p:spPr>
+          <a:xfrm>
+            <a:off x="1006900" y="1188637"/>
+            <a:ext cx="3141430" cy="4480726"/>
+          </a:xfrm>
+        </p:spPr>
+        <p:txBody>
+          <a:bodyPr>
+            <a:normAutofit/>
+          </a:bodyPr>
+          <a:lstStyle/>
+          <a:p>
+            <a:pPr algn="r"/>
+            <a:r>
+              <a:rPr lang="de-AT" sz="6600"/>
+              <a:t>Why?	</a:t>
+            </a:r>
+          </a:p>
+        </p:txBody>
+      </p:sp>
+      <p:cxnSp>
+        <p:nvCxnSpPr>
+          <p:cNvPr id="16" name="Straight Connector 15">
+            <a:extLst>
+              <a:ext uri="{FF2B5EF4-FFF2-40B4-BE49-F238E27FC236}">
+                <a16:creationId xmlns:a16="http://schemas.microsoft.com/office/drawing/2014/main" id="{23AAC9B5-8015-485C-ACF9-A750390E9A56}"/>
+              </a:ext>
+              <a:ext uri="{C183D7F6-B498-43B3-948B-1728B52AA6E4}">
+                <adec:decorative xmlns:adec="http://schemas.microsoft.com/office/drawing/2017/decorative" val="1"/>
+              </a:ext>
+            </a:extLst>
+          </p:cNvPr>
+          <p:cNvCxnSpPr>
+            <a:cxnSpLocks noGrp="1" noRot="1" noChangeAspect="1" noMove="1" noResize="1" noEditPoints="1" noAdjustHandles="1" noChangeArrowheads="1" noChangeShapeType="1"/>
+          </p:cNvCxnSpPr>
+          <p:nvPr>
+            <p:extLst>
+              <p:ext uri="{386F3935-93C4-4BCD-93E2-E3B085C9AB24}">
+                <p16:designElem xmlns:p16="http://schemas.microsoft.com/office/powerpoint/2015/main" val="1"/>
+              </p:ext>
+            </p:extLst>
+          </p:nvPr>
+        </p:nvCxnSpPr>
+        <p:spPr>
+          <a:xfrm>
+            <a:off x="4654296" y="1852863"/>
+            <a:ext cx="0" cy="3236495"/>
+          </a:xfrm>
+          <a:prstGeom prst="line">
+            <a:avLst/>
+          </a:prstGeom>
+          <a:ln w="19050" cap="sq">
+            <a:solidFill>
+              <a:schemeClr val="tx1">
+                <a:lumMod val="75000"/>
+                <a:lumOff val="25000"/>
+              </a:schemeClr>
+            </a:solidFill>
+          </a:ln>
+        </p:spPr>
+        <p:style>
+          <a:lnRef idx="1">
+            <a:schemeClr val="accent1"/>
+          </a:lnRef>
+          <a:fillRef idx="0">
+            <a:schemeClr val="accent1"/>
+          </a:fillRef>
+          <a:effectRef idx="0">
+            <a:schemeClr val="accent1"/>
+          </a:effectRef>
+          <a:fontRef idx="minor">
+            <a:schemeClr val="tx1"/>
+          </a:fontRef>
+        </p:style>
+      </p:cxnSp>
       <p:sp>
         <p:nvSpPr>
           <p:cNvPr id="3" name="Inhaltsplatzhalter 2">
@@ -3504,124 +4168,45 @@
             <p:ph idx="1"/>
           </p:nvPr>
         </p:nvSpPr>
-        <p:spPr/>
-        <p:txBody>
-          <a:bodyPr/>
-          <a:lstStyle/>
-          <a:p>
-            <a:r>
-              <a:rPr lang="de-AT" dirty="0" err="1"/>
-              <a:t>Recommendations</a:t>
-            </a:r>
-            <a:r>
-              <a:rPr lang="de-AT" dirty="0"/>
-              <a:t> </a:t>
-            </a:r>
-            <a:r>
-              <a:rPr lang="de-AT" dirty="0" err="1"/>
-              <a:t>are</a:t>
-            </a:r>
-            <a:r>
-              <a:rPr lang="de-AT" dirty="0"/>
-              <a:t> </a:t>
-            </a:r>
-            <a:r>
-              <a:rPr lang="de-AT" dirty="0" err="1"/>
-              <a:t>everywhere</a:t>
-            </a:r>
-            <a:endParaRPr lang="de-AT" dirty="0"/>
-          </a:p>
-          <a:p>
-            <a:r>
-              <a:rPr lang="de-AT" dirty="0"/>
-              <a:t>Music </a:t>
-            </a:r>
-            <a:r>
-              <a:rPr lang="de-AT" dirty="0" err="1"/>
-              <a:t>industry</a:t>
-            </a:r>
-            <a:r>
-              <a:rPr lang="de-AT" dirty="0"/>
-              <a:t> </a:t>
-            </a:r>
-            <a:r>
-              <a:rPr lang="de-AT" dirty="0" err="1"/>
-              <a:t>is</a:t>
-            </a:r>
-            <a:r>
-              <a:rPr lang="de-AT" dirty="0"/>
-              <a:t> </a:t>
-            </a:r>
-            <a:r>
-              <a:rPr lang="de-AT" dirty="0" err="1"/>
-              <a:t>very</a:t>
-            </a:r>
-            <a:r>
-              <a:rPr lang="de-AT" dirty="0"/>
-              <a:t> </a:t>
-            </a:r>
-            <a:r>
-              <a:rPr lang="de-AT" dirty="0" err="1"/>
-              <a:t>popular</a:t>
-            </a:r>
-            <a:r>
-              <a:rPr lang="de-AT" dirty="0"/>
-              <a:t> </a:t>
-            </a:r>
-          </a:p>
-          <a:p>
-            <a:r>
-              <a:rPr lang="de-AT" dirty="0"/>
-              <a:t>Fast </a:t>
-            </a:r>
-            <a:r>
-              <a:rPr lang="de-AT" dirty="0" err="1"/>
-              <a:t>paced</a:t>
-            </a:r>
-            <a:r>
-              <a:rPr lang="de-AT" dirty="0"/>
-              <a:t> </a:t>
-            </a:r>
-            <a:r>
-              <a:rPr lang="de-AT" dirty="0" err="1"/>
-              <a:t>industry</a:t>
-            </a:r>
-            <a:endParaRPr lang="de-AT" dirty="0"/>
-          </a:p>
-          <a:p>
-            <a:r>
-              <a:rPr lang="de-AT" dirty="0"/>
+        <p:spPr>
+          <a:xfrm>
+            <a:off x="5138928" y="1338729"/>
+            <a:ext cx="4795584" cy="4180542"/>
+          </a:xfrm>
+        </p:spPr>
+        <p:txBody>
+          <a:bodyPr anchor="ctr">
+            <a:normAutofit/>
+          </a:bodyPr>
+          <a:lstStyle/>
+          <a:p>
+            <a:r>
+              <a:rPr lang="de-AT" sz="2400"/>
+              <a:t>Recommendations are everywhere</a:t>
+            </a:r>
+          </a:p>
+          <a:p>
+            <a:r>
+              <a:rPr lang="de-AT" sz="2400"/>
+              <a:t>Music industry is very popular </a:t>
+            </a:r>
+          </a:p>
+          <a:p>
+            <a:r>
+              <a:rPr lang="de-AT" sz="2400"/>
+              <a:t>Fast paced industry</a:t>
+            </a:r>
+          </a:p>
+          <a:p>
+            <a:r>
+              <a:rPr lang="de-AT" sz="2400"/>
               <a:t>Breakthroughs in AI</a:t>
             </a:r>
           </a:p>
           <a:p>
             <a:r>
-              <a:rPr lang="de-AT" dirty="0"/>
-              <a:t>Are </a:t>
-            </a:r>
-            <a:r>
-              <a:rPr lang="de-AT" dirty="0" err="1"/>
-              <a:t>we</a:t>
-            </a:r>
-            <a:r>
-              <a:rPr lang="de-AT" dirty="0"/>
-              <a:t> </a:t>
-            </a:r>
-            <a:r>
-              <a:rPr lang="de-AT" dirty="0" err="1"/>
-              <a:t>there</a:t>
-            </a:r>
-            <a:r>
-              <a:rPr lang="de-AT" dirty="0"/>
-              <a:t> </a:t>
-            </a:r>
-            <a:r>
-              <a:rPr lang="de-AT" dirty="0" err="1"/>
-              <a:t>yet</a:t>
-            </a:r>
-            <a:r>
-              <a:rPr lang="de-AT" dirty="0"/>
-              <a:t>?</a:t>
+              <a:rPr lang="de-AT" sz="2400"/>
+              <a:t>Are we there yet?</a:t>
             </a:r>
           </a:p>
         </p:txBody>
@@ -3661,7 +4246,7 @@
           <p:cNvPr id="2" name="Titel 1">
             <a:extLst>
               <a:ext uri="{FF2B5EF4-FFF2-40B4-BE49-F238E27FC236}">
-                <a16:creationId xmlns:a16="http://schemas.microsoft.com/office/drawing/2014/main" id="{989EF6F6-AA6A-4DD8-9025-659CFC0C0AE4}"/>
+                <a16:creationId xmlns:a16="http://schemas.microsoft.com/office/drawing/2014/main" id="{3E398CFA-6A8C-24AE-89F8-1CE1DDEC4D01}"/>
               </a:ext>
             </a:extLst>
           </p:cNvPr>
@@ -3678,13 +4263,10 @@
           <a:lstStyle/>
           <a:p>
             <a:r>
-              <a:rPr lang="de-AT" dirty="0" err="1"/>
-              <a:t>Current</a:t>
-            </a:r>
-            <a:r>
-              <a:rPr lang="de-AT" dirty="0"/>
-              <a:t> Methods</a:t>
-            </a:r>
+              <a:rPr lang="de-DE" dirty="0" err="1"/>
+              <a:t>Categories</a:t>
+            </a:r>
+            <a:endParaRPr lang="de-DE" dirty="0"/>
           </a:p>
         </p:txBody>
       </p:sp>
@@ -3693,7 +4275,7 @@
           <p:cNvPr id="3" name="Inhaltsplatzhalter 2">
             <a:extLst>
               <a:ext uri="{FF2B5EF4-FFF2-40B4-BE49-F238E27FC236}">
-                <a16:creationId xmlns:a16="http://schemas.microsoft.com/office/drawing/2014/main" id="{E31A742B-BEFF-49E8-AE4A-ECEA9011C68E}"/>
+                <a16:creationId xmlns:a16="http://schemas.microsoft.com/office/drawing/2014/main" id="{55CFE2A8-23CB-6540-B9A3-8F7A55C52C1F}"/>
               </a:ext>
             </a:extLst>
           </p:cNvPr>
@@ -3709,14 +4291,71 @@
           <a:bodyPr/>
           <a:lstStyle/>
           <a:p>
-            <a:endParaRPr lang="de-AT"/>
+            <a:r>
+              <a:rPr lang="de-DE" dirty="0"/>
+              <a:t>Collaborative </a:t>
+            </a:r>
+            <a:r>
+              <a:rPr lang="de-DE" dirty="0" err="1"/>
+              <a:t>filtering</a:t>
+            </a:r>
+            <a:endParaRPr lang="de-DE" dirty="0"/>
+          </a:p>
+          <a:p>
+            <a:r>
+              <a:rPr lang="de-DE" dirty="0"/>
+              <a:t>Content-</a:t>
+            </a:r>
+            <a:r>
+              <a:rPr lang="de-DE" dirty="0" err="1"/>
+              <a:t>based</a:t>
+            </a:r>
+            <a:r>
+              <a:rPr lang="de-DE" dirty="0"/>
+              <a:t> </a:t>
+            </a:r>
+            <a:r>
+              <a:rPr lang="de-DE" dirty="0" err="1"/>
+              <a:t>filtering</a:t>
+            </a:r>
+            <a:endParaRPr lang="de-DE" dirty="0"/>
+          </a:p>
+          <a:p>
+            <a:r>
+              <a:rPr lang="de-DE" dirty="0"/>
+              <a:t>Knowledge-</a:t>
+            </a:r>
+            <a:r>
+              <a:rPr lang="de-DE" dirty="0" err="1"/>
+              <a:t>based</a:t>
+            </a:r>
+            <a:r>
+              <a:rPr lang="de-DE" dirty="0"/>
+              <a:t> </a:t>
+            </a:r>
+            <a:r>
+              <a:rPr lang="de-DE" dirty="0" err="1"/>
+              <a:t>recommendations</a:t>
+            </a:r>
+            <a:endParaRPr lang="de-DE" dirty="0"/>
+          </a:p>
+          <a:p>
+            <a:r>
+              <a:rPr lang="de-DE" dirty="0"/>
+              <a:t>Hybrid </a:t>
+            </a:r>
+            <a:r>
+              <a:rPr lang="de-DE" dirty="0" err="1"/>
+              <a:t>recommendations</a:t>
+            </a:r>
+            <a:endParaRPr lang="de-DE" dirty="0"/>
           </a:p>
         </p:txBody>
       </p:sp>
     </p:spTree>
     <p:extLst>
       <p:ext uri="{BB962C8B-B14F-4D97-AF65-F5344CB8AC3E}">
-        <p14:creationId xmlns:p14="http://schemas.microsoft.com/office/powerpoint/2010/main" val="3775381770"/>
+        <p14:creationId xmlns:p14="http://schemas.microsoft.com/office/powerpoint/2010/main" val="948448861"/>
       </p:ext>
     </p:extLst>
   </p:cSld>
@@ -3748,7 +4387,7 @@
           <p:cNvPr id="2" name="Titel 1">
             <a:extLst>
               <a:ext uri="{FF2B5EF4-FFF2-40B4-BE49-F238E27FC236}">
-                <a16:creationId xmlns:a16="http://schemas.microsoft.com/office/drawing/2014/main" id="{3FA8690F-3219-4D30-9A7E-15B7F83FFB6A}"/>
+                <a16:creationId xmlns:a16="http://schemas.microsoft.com/office/drawing/2014/main" id="{989EF6F6-AA6A-4DD8-9025-659CFC0C0AE4}"/>
               </a:ext>
             </a:extLst>
           </p:cNvPr>
@@ -3766,11 +4405,64 @@
           <a:p>
             <a:r>
               <a:rPr lang="de-AT" dirty="0"/>
-              <a:t>Grob </a:t>
+              <a:t>State-</a:t>
             </a:r>
             <a:r>
               <a:rPr lang="de-AT" dirty="0" err="1"/>
-              <a:t>paper</a:t>
+              <a:t>of</a:t>
+            </a:r>
+            <a:r>
+              <a:rPr lang="de-AT" dirty="0"/>
+              <a:t>-</a:t>
+            </a:r>
+            <a:r>
+              <a:rPr lang="de-AT" dirty="0" err="1"/>
+              <a:t>the</a:t>
+            </a:r>
+            <a:r>
+              <a:rPr lang="de-AT" dirty="0"/>
+              <a:t>-art </a:t>
+            </a:r>
+          </a:p>
+        </p:txBody>
+      </p:sp>
+      <p:sp>
+        <p:nvSpPr>
+          <p:cNvPr id="3" name="Inhaltsplatzhalter 2">
+            <a:extLst>
+              <a:ext uri="{FF2B5EF4-FFF2-40B4-BE49-F238E27FC236}">
+                <a16:creationId xmlns:a16="http://schemas.microsoft.com/office/drawing/2014/main" id="{E31A742B-BEFF-49E8-AE4A-ECEA9011C68E}"/>
+              </a:ext>
+            </a:extLst>
+          </p:cNvPr>
+          <p:cNvSpPr>
+            <a:spLocks noGrp="1"/>
+          </p:cNvSpPr>
+          <p:nvPr>
+            <p:ph idx="1"/>
+          </p:nvPr>
+        </p:nvSpPr>
+        <p:spPr/>
+        <p:txBody>
+          <a:bodyPr>
+            <a:normAutofit lnSpcReduction="10000"/>
+          </a:bodyPr>
+          <a:lstStyle/>
+          <a:p>
+            <a:r>
+              <a:rPr lang="de-AT" dirty="0"/>
+              <a:t>Personality, </a:t>
+            </a:r>
+            <a:r>
+              <a:rPr lang="de-AT" dirty="0" err="1"/>
+              <a:t>mood</a:t>
+            </a:r>
+            <a:endParaRPr lang="de-AT" dirty="0"/>
+          </a:p>
+          <a:p>
+            <a:r>
+              <a:rPr lang="de-AT" dirty="0" err="1"/>
+              <a:t>Facial</a:t>
             </a:r>
             <a:r>
               <a:rPr lang="de-AT" dirty="0"/>
@@ -3778,44 +4470,78 @@
             </a:r>
             <a:r>
               <a:rPr lang="de-AT" dirty="0" err="1"/>
-              <a:t>approaches</a:t>
-            </a:r>
+              <a:t>expressions</a:t>
+            </a:r>
+            <a:endParaRPr lang="de-AT" dirty="0"/>
+          </a:p>
+          <a:p>
+            <a:endParaRPr lang="de-AT" dirty="0"/>
+          </a:p>
+          <a:p>
+            <a:endParaRPr lang="de-AT" dirty="0"/>
+          </a:p>
+          <a:p>
             <a:r>
               <a:rPr lang="de-AT" dirty="0"/>
-              <a:t> herzeigen</a:t>
-            </a:r>
-          </a:p>
-        </p:txBody>
-      </p:sp>
-      <p:sp>
-        <p:nvSpPr>
-          <p:cNvPr id="3" name="Inhaltsplatzhalter 2">
-            <a:extLst>
-              <a:ext uri="{FF2B5EF4-FFF2-40B4-BE49-F238E27FC236}">
-                <a16:creationId xmlns:a16="http://schemas.microsoft.com/office/drawing/2014/main" id="{AFD20D00-204E-448E-9E55-7FBA5A50FEB8}"/>
-              </a:ext>
-            </a:extLst>
-          </p:cNvPr>
-          <p:cNvSpPr>
-            <a:spLocks noGrp="1"/>
-          </p:cNvSpPr>
-          <p:nvPr>
-            <p:ph idx="1"/>
-          </p:nvPr>
-        </p:nvSpPr>
-        <p:spPr/>
-        <p:txBody>
-          <a:bodyPr/>
-          <a:lstStyle/>
-          <a:p>
-            <a:endParaRPr lang="de-AT"/>
+              <a:t>Tackle </a:t>
+            </a:r>
+            <a:r>
+              <a:rPr lang="de-AT" dirty="0" err="1"/>
+              <a:t>current</a:t>
+            </a:r>
+            <a:r>
+              <a:rPr lang="de-AT" dirty="0"/>
+              <a:t> </a:t>
+            </a:r>
+            <a:r>
+              <a:rPr lang="de-AT" dirty="0" err="1"/>
+              <a:t>limitations</a:t>
+            </a:r>
+            <a:r>
+              <a:rPr lang="de-AT" dirty="0"/>
+              <a:t> </a:t>
+            </a:r>
+          </a:p>
+          <a:p>
+            <a:pPr marL="0" indent="0">
+              <a:buNone/>
+            </a:pPr>
+            <a:endParaRPr lang="de-AT" dirty="0"/>
+          </a:p>
+          <a:p>
+            <a:endParaRPr lang="de-AT" dirty="0"/>
+          </a:p>
+          <a:p>
+            <a:r>
+              <a:rPr lang="de-AT" dirty="0"/>
+              <a:t>Personality </a:t>
+            </a:r>
+            <a:r>
+              <a:rPr lang="de-AT" dirty="0" err="1"/>
+              <a:t>bias</a:t>
+            </a:r>
+            <a:endParaRPr lang="de-AT" dirty="0"/>
+          </a:p>
+          <a:p>
+            <a:r>
+              <a:rPr lang="de-AT" dirty="0"/>
+              <a:t>Gender </a:t>
+            </a:r>
+            <a:r>
+              <a:rPr lang="de-AT" dirty="0" err="1"/>
+              <a:t>bias</a:t>
+            </a:r>
+            <a:r>
+              <a:rPr lang="de-AT" dirty="0"/>
+              <a:t> </a:t>
+            </a:r>
           </a:p>
         </p:txBody>
       </p:sp>
     </p:spTree>
     <p:extLst>
       <p:ext uri="{BB962C8B-B14F-4D97-AF65-F5344CB8AC3E}">
-        <p14:creationId xmlns:p14="http://schemas.microsoft.com/office/powerpoint/2010/main" val="1214727529"/>
+        <p14:creationId xmlns:p14="http://schemas.microsoft.com/office/powerpoint/2010/main" val="3775381770"/>
       </p:ext>
     </p:extLst>
   </p:cSld>
@@ -3847,7 +4573,7 @@
           <p:cNvPr id="2" name="Titel 1">
             <a:extLst>
               <a:ext uri="{FF2B5EF4-FFF2-40B4-BE49-F238E27FC236}">
-                <a16:creationId xmlns:a16="http://schemas.microsoft.com/office/drawing/2014/main" id="{C01F638B-5FA5-401B-B579-514657733BC0}"/>
+                <a16:creationId xmlns:a16="http://schemas.microsoft.com/office/drawing/2014/main" id="{3FA8690F-3219-4D30-9A7E-15B7F83FFB6A}"/>
               </a:ext>
             </a:extLst>
           </p:cNvPr>
@@ -3865,68 +4591,11 @@
           <a:p>
             <a:r>
               <a:rPr lang="de-AT" dirty="0"/>
-              <a:t>Open </a:t>
+              <a:t>Grob </a:t>
             </a:r>
             <a:r>
               <a:rPr lang="de-AT" dirty="0" err="1"/>
-              <a:t>problems</a:t>
-            </a:r>
-            <a:r>
-              <a:rPr lang="de-AT" dirty="0"/>
-              <a:t> and </a:t>
-            </a:r>
-            <a:r>
-              <a:rPr lang="de-AT" dirty="0" err="1"/>
-              <a:t>challenges</a:t>
-            </a:r>
-            <a:endParaRPr lang="de-AT" dirty="0"/>
-          </a:p>
-        </p:txBody>
-      </p:sp>
-      <p:sp>
-        <p:nvSpPr>
-          <p:cNvPr id="3" name="Inhaltsplatzhalter 2">
-            <a:extLst>
-              <a:ext uri="{FF2B5EF4-FFF2-40B4-BE49-F238E27FC236}">
-                <a16:creationId xmlns:a16="http://schemas.microsoft.com/office/drawing/2014/main" id="{8FF0E0A1-E8BF-46CD-BD68-63DB967E5D5D}"/>
-              </a:ext>
-            </a:extLst>
-          </p:cNvPr>
-          <p:cNvSpPr>
-            <a:spLocks noGrp="1"/>
-          </p:cNvSpPr>
-          <p:nvPr>
-            <p:ph idx="1"/>
-          </p:nvPr>
-        </p:nvSpPr>
-        <p:spPr/>
-        <p:txBody>
-          <a:bodyPr/>
-          <a:lstStyle/>
-          <a:p>
-            <a:r>
-              <a:rPr lang="de-AT" dirty="0"/>
-              <a:t>Model </a:t>
-            </a:r>
-            <a:r>
-              <a:rPr lang="de-AT" dirty="0" err="1"/>
-              <a:t>relationships</a:t>
-            </a:r>
-            <a:r>
-              <a:rPr lang="de-AT" dirty="0"/>
-              <a:t> and all relevant </a:t>
-            </a:r>
-            <a:r>
-              <a:rPr lang="de-AT" dirty="0" err="1"/>
-              <a:t>aspects</a:t>
-            </a:r>
-            <a:endParaRPr lang="de-AT" dirty="0"/>
-          </a:p>
-          <a:p>
-            <a:pPr lvl="1"/>
-            <a:r>
-              <a:rPr lang="de-AT" dirty="0" err="1"/>
-              <a:t>What</a:t>
+              <a:t>paper</a:t>
             </a:r>
             <a:r>
               <a:rPr lang="de-AT" dirty="0"/>
@@ -3934,152 +4603,639 @@
             </a:r>
             <a:r>
               <a:rPr lang="de-AT" dirty="0" err="1"/>
-              <a:t>is</a:t>
+              <a:t>approaches</a:t>
             </a:r>
             <a:r>
               <a:rPr lang="de-AT" dirty="0"/>
-              <a:t> relevant? </a:t>
-            </a:r>
-            <a:r>
-              <a:rPr lang="de-AT" dirty="0" err="1"/>
-              <a:t>What</a:t>
-            </a:r>
-            <a:r>
-              <a:rPr lang="de-AT" dirty="0"/>
-              <a:t> </a:t>
-            </a:r>
-            <a:r>
-              <a:rPr lang="de-AT" dirty="0" err="1"/>
-              <a:t>is</a:t>
-            </a:r>
-            <a:r>
-              <a:rPr lang="de-AT" dirty="0"/>
-              <a:t> redundant </a:t>
-            </a:r>
-            <a:r>
-              <a:rPr lang="de-AT" dirty="0" err="1"/>
-              <a:t>information</a:t>
-            </a:r>
-            <a:r>
-              <a:rPr lang="de-AT" dirty="0"/>
-              <a:t>?</a:t>
-            </a:r>
-          </a:p>
-          <a:p>
-            <a:r>
-              <a:rPr lang="de-AT" dirty="0" err="1"/>
-              <a:t>User‘s</a:t>
-            </a:r>
-            <a:r>
-              <a:rPr lang="de-AT" dirty="0"/>
-              <a:t> </a:t>
-            </a:r>
-            <a:r>
-              <a:rPr lang="de-AT" dirty="0" err="1"/>
-              <a:t>satisfaction</a:t>
-            </a:r>
-            <a:endParaRPr lang="de-AT" dirty="0"/>
+              <a:t> herzeigen</a:t>
+            </a:r>
+          </a:p>
+        </p:txBody>
+      </p:sp>
+      <p:sp>
+        <p:nvSpPr>
+          <p:cNvPr id="3" name="Inhaltsplatzhalter 2">
+            <a:extLst>
+              <a:ext uri="{FF2B5EF4-FFF2-40B4-BE49-F238E27FC236}">
+                <a16:creationId xmlns:a16="http://schemas.microsoft.com/office/drawing/2014/main" id="{AFD20D00-204E-448E-9E55-7FBA5A50FEB8}"/>
+              </a:ext>
+            </a:extLst>
+          </p:cNvPr>
+          <p:cNvSpPr>
+            <a:spLocks noGrp="1"/>
+          </p:cNvSpPr>
+          <p:nvPr>
+            <p:ph idx="1"/>
+          </p:nvPr>
+        </p:nvSpPr>
+        <p:spPr/>
+        <p:txBody>
+          <a:bodyPr/>
+          <a:lstStyle/>
+          <a:p>
+            <a:endParaRPr lang="de-AT"/>
+          </a:p>
+        </p:txBody>
+      </p:sp>
+    </p:spTree>
+    <p:extLst>
+      <p:ext uri="{BB962C8B-B14F-4D97-AF65-F5344CB8AC3E}">
+        <p14:creationId xmlns:p14="http://schemas.microsoft.com/office/powerpoint/2010/main" val="1214727529"/>
+      </p:ext>
+    </p:extLst>
+  </p:cSld>
+  <p:clrMapOvr>
+    <a:masterClrMapping/>
+  </p:clrMapOvr>
+</p:sld>
+</file>
+
+<file path=ppt/slides/slide6.xml><?xml version="1.0" encoding="utf-8"?>
+<p:sld xmlns:a="http://schemas.openxmlformats.org/drawingml/2006/main" xmlns:r="http://schemas.openxmlformats.org/officeDocument/2006/relationships" xmlns:p="http://schemas.openxmlformats.org/presentationml/2006/main">
+  <p:cSld>
+    <p:bg>
+      <p:bgPr>
+        <a:solidFill>
+          <a:schemeClr val="bg1"/>
+        </a:solidFill>
+        <a:effectLst/>
+      </p:bgPr>
+    </p:bg>
+    <p:spTree>
+      <p:nvGrpSpPr>
+        <p:cNvPr id="1" name=""/>
+        <p:cNvGrpSpPr/>
+        <p:nvPr/>
+      </p:nvGrpSpPr>
+      <p:grpSpPr>
+        <a:xfrm>
+          <a:off x="0" y="0"/>
+          <a:ext cx="0" cy="0"/>
+          <a:chOff x="0" y="0"/>
+          <a:chExt cx="0" cy="0"/>
+        </a:xfrm>
+      </p:grpSpPr>
+      <p:sp useBgFill="1">
+        <p:nvSpPr>
+          <p:cNvPr id="28" name="Rectangle 20">
+            <a:extLst>
+              <a:ext uri="{FF2B5EF4-FFF2-40B4-BE49-F238E27FC236}">
+                <a16:creationId xmlns:a16="http://schemas.microsoft.com/office/drawing/2014/main" id="{081EA652-8C6A-4E69-BEB9-170809474553}"/>
+              </a:ext>
+              <a:ext uri="{C183D7F6-B498-43B3-948B-1728B52AA6E4}">
+                <adec:decorative xmlns:adec="http://schemas.microsoft.com/office/drawing/2017/decorative" val="1"/>
+              </a:ext>
+            </a:extLst>
+          </p:cNvPr>
+          <p:cNvSpPr>
+            <a:spLocks noGrp="1" noRot="1" noChangeAspect="1" noMove="1" noResize="1" noEditPoints="1" noAdjustHandles="1" noChangeArrowheads="1" noChangeShapeType="1" noTextEdit="1"/>
+          </p:cNvSpPr>
+          <p:nvPr>
+            <p:extLst>
+              <p:ext uri="{386F3935-93C4-4BCD-93E2-E3B085C9AB24}">
+                <p16:designElem xmlns:p16="http://schemas.microsoft.com/office/powerpoint/2015/main" val="1"/>
+              </p:ext>
+            </p:extLst>
+          </p:nvPr>
+        </p:nvSpPr>
+        <p:spPr>
+          <a:xfrm>
+            <a:off x="0" y="0"/>
+            <a:ext cx="12192000" cy="6858000"/>
+          </a:xfrm>
+          <a:prstGeom prst="rect">
+            <a:avLst/>
+          </a:prstGeom>
+          <a:ln>
+            <a:noFill/>
+          </a:ln>
+        </p:spPr>
+        <p:style>
+          <a:lnRef idx="2">
+            <a:schemeClr val="accent1">
+              <a:shade val="50000"/>
+            </a:schemeClr>
+          </a:lnRef>
+          <a:fillRef idx="1">
+            <a:schemeClr val="accent1"/>
+          </a:fillRef>
+          <a:effectRef idx="0">
+            <a:schemeClr val="accent1"/>
+          </a:effectRef>
+          <a:fontRef idx="minor">
+            <a:schemeClr val="lt1"/>
+          </a:fontRef>
+        </p:style>
+        <p:txBody>
+          <a:bodyPr rtlCol="0" anchor="ctr"/>
+          <a:lstStyle/>
+          <a:p>
+            <a:pPr algn="ctr"/>
+            <a:endParaRPr lang="en-US"/>
+          </a:p>
+        </p:txBody>
+      </p:sp>
+      <p:sp>
+        <p:nvSpPr>
+          <p:cNvPr id="30" name="Freeform: Shape 22">
+            <a:extLst>
+              <a:ext uri="{FF2B5EF4-FFF2-40B4-BE49-F238E27FC236}">
+                <a16:creationId xmlns:a16="http://schemas.microsoft.com/office/drawing/2014/main" id="{A4026A73-1F7F-49F2-B319-8CA3B3D53269}"/>
+              </a:ext>
+              <a:ext uri="{C183D7F6-B498-43B3-948B-1728B52AA6E4}">
+                <adec:decorative xmlns:adec="http://schemas.microsoft.com/office/drawing/2017/decorative" val="1"/>
+              </a:ext>
+            </a:extLst>
+          </p:cNvPr>
+          <p:cNvSpPr>
+            <a:spLocks noGrp="1" noRot="1" noChangeAspect="1" noMove="1" noResize="1" noEditPoints="1" noAdjustHandles="1" noChangeArrowheads="1" noChangeShapeType="1" noTextEdit="1"/>
+          </p:cNvSpPr>
+          <p:nvPr>
+            <p:extLst>
+              <p:ext uri="{386F3935-93C4-4BCD-93E2-E3B085C9AB24}">
+                <p16:designElem xmlns:p16="http://schemas.microsoft.com/office/powerpoint/2015/main" val="1"/>
+              </p:ext>
+            </p:extLst>
+          </p:nvPr>
+        </p:nvSpPr>
+        <p:spPr>
+          <a:xfrm>
+            <a:off x="321732" y="321733"/>
+            <a:ext cx="11546828" cy="6214534"/>
+          </a:xfrm>
+          <a:custGeom>
+            <a:avLst/>
+            <a:gdLst>
+              <a:gd name="connsiteX0" fmla="*/ 0 w 11546828"/>
+              <a:gd name="connsiteY0" fmla="*/ 0 h 6214534"/>
+              <a:gd name="connsiteX1" fmla="*/ 7965430 w 11546828"/>
+              <a:gd name="connsiteY1" fmla="*/ 0 h 6214534"/>
+              <a:gd name="connsiteX2" fmla="*/ 7965430 w 11546828"/>
+              <a:gd name="connsiteY2" fmla="*/ 1786 h 6214534"/>
+              <a:gd name="connsiteX3" fmla="*/ 11546828 w 11546828"/>
+              <a:gd name="connsiteY3" fmla="*/ 1786 h 6214534"/>
+              <a:gd name="connsiteX4" fmla="*/ 11546828 w 11546828"/>
+              <a:gd name="connsiteY4" fmla="*/ 2866740 h 6214534"/>
+              <a:gd name="connsiteX5" fmla="*/ 11225095 w 11546828"/>
+              <a:gd name="connsiteY5" fmla="*/ 3179536 h 6214534"/>
+              <a:gd name="connsiteX6" fmla="*/ 11225095 w 11546828"/>
+              <a:gd name="connsiteY6" fmla="*/ 301542 h 6214534"/>
+              <a:gd name="connsiteX7" fmla="*/ 320042 w 11546828"/>
+              <a:gd name="connsiteY7" fmla="*/ 301542 h 6214534"/>
+              <a:gd name="connsiteX8" fmla="*/ 320042 w 11546828"/>
+              <a:gd name="connsiteY8" fmla="*/ 5909424 h 6214534"/>
+              <a:gd name="connsiteX9" fmla="*/ 8417210 w 11546828"/>
+              <a:gd name="connsiteY9" fmla="*/ 5909424 h 6214534"/>
+              <a:gd name="connsiteX10" fmla="*/ 8103383 w 11546828"/>
+              <a:gd name="connsiteY10" fmla="*/ 6214534 h 6214534"/>
+              <a:gd name="connsiteX11" fmla="*/ 7222929 w 11546828"/>
+              <a:gd name="connsiteY11" fmla="*/ 6214534 h 6214534"/>
+              <a:gd name="connsiteX12" fmla="*/ 7222929 w 11546828"/>
+              <a:gd name="connsiteY12" fmla="*/ 6212748 h 6214534"/>
+              <a:gd name="connsiteX13" fmla="*/ 0 w 11546828"/>
+              <a:gd name="connsiteY13" fmla="*/ 6212748 h 6214534"/>
+            </a:gdLst>
+            <a:ahLst/>
+            <a:cxnLst>
+              <a:cxn ang="0">
+                <a:pos x="connsiteX0" y="connsiteY0"/>
+              </a:cxn>
+              <a:cxn ang="0">
+                <a:pos x="connsiteX1" y="connsiteY1"/>
+              </a:cxn>
+              <a:cxn ang="0">
+                <a:pos x="connsiteX2" y="connsiteY2"/>
+              </a:cxn>
+              <a:cxn ang="0">
+                <a:pos x="connsiteX3" y="connsiteY3"/>
+              </a:cxn>
+              <a:cxn ang="0">
+                <a:pos x="connsiteX4" y="connsiteY4"/>
+              </a:cxn>
+              <a:cxn ang="0">
+                <a:pos x="connsiteX5" y="connsiteY5"/>
+              </a:cxn>
+              <a:cxn ang="0">
+                <a:pos x="connsiteX6" y="connsiteY6"/>
+              </a:cxn>
+              <a:cxn ang="0">
+                <a:pos x="connsiteX7" y="connsiteY7"/>
+              </a:cxn>
+              <a:cxn ang="0">
+                <a:pos x="connsiteX8" y="connsiteY8"/>
+              </a:cxn>
+              <a:cxn ang="0">
+                <a:pos x="connsiteX9" y="connsiteY9"/>
+              </a:cxn>
+              <a:cxn ang="0">
+                <a:pos x="connsiteX10" y="connsiteY10"/>
+              </a:cxn>
+              <a:cxn ang="0">
+                <a:pos x="connsiteX11" y="connsiteY11"/>
+              </a:cxn>
+              <a:cxn ang="0">
+                <a:pos x="connsiteX12" y="connsiteY12"/>
+              </a:cxn>
+              <a:cxn ang="0">
+                <a:pos x="connsiteX13" y="connsiteY13"/>
+              </a:cxn>
+            </a:cxnLst>
+            <a:rect l="l" t="t" r="r" b="b"/>
+            <a:pathLst>
+              <a:path w="11546828" h="6214534">
+                <a:moveTo>
+                  <a:pt x="0" y="0"/>
+                </a:moveTo>
+                <a:lnTo>
+                  <a:pt x="7965430" y="0"/>
+                </a:lnTo>
+                <a:lnTo>
+                  <a:pt x="7965430" y="1786"/>
+                </a:lnTo>
+                <a:lnTo>
+                  <a:pt x="11546828" y="1786"/>
+                </a:lnTo>
+                <a:lnTo>
+                  <a:pt x="11546828" y="2866740"/>
+                </a:lnTo>
+                <a:lnTo>
+                  <a:pt x="11225095" y="3179536"/>
+                </a:lnTo>
+                <a:lnTo>
+                  <a:pt x="11225095" y="301542"/>
+                </a:lnTo>
+                <a:lnTo>
+                  <a:pt x="320042" y="301542"/>
+                </a:lnTo>
+                <a:lnTo>
+                  <a:pt x="320042" y="5909424"/>
+                </a:lnTo>
+                <a:lnTo>
+                  <a:pt x="8417210" y="5909424"/>
+                </a:lnTo>
+                <a:lnTo>
+                  <a:pt x="8103383" y="6214534"/>
+                </a:lnTo>
+                <a:lnTo>
+                  <a:pt x="7222929" y="6214534"/>
+                </a:lnTo>
+                <a:lnTo>
+                  <a:pt x="7222929" y="6212748"/>
+                </a:lnTo>
+                <a:lnTo>
+                  <a:pt x="0" y="6212748"/>
+                </a:lnTo>
+                <a:close/>
+              </a:path>
+            </a:pathLst>
+          </a:custGeom>
+          <a:solidFill>
+            <a:schemeClr val="tx1">
+              <a:lumMod val="50000"/>
+              <a:lumOff val="50000"/>
+              <a:alpha val="25000"/>
+            </a:schemeClr>
+          </a:solidFill>
+          <a:ln>
+            <a:noFill/>
+          </a:ln>
+        </p:spPr>
+        <p:style>
+          <a:lnRef idx="2">
+            <a:schemeClr val="accent1">
+              <a:shade val="50000"/>
+            </a:schemeClr>
+          </a:lnRef>
+          <a:fillRef idx="1">
+            <a:schemeClr val="accent1"/>
+          </a:fillRef>
+          <a:effectRef idx="0">
+            <a:schemeClr val="accent1"/>
+          </a:effectRef>
+          <a:fontRef idx="minor">
+            <a:schemeClr val="lt1"/>
+          </a:fontRef>
+        </p:style>
+        <p:txBody>
+          <a:bodyPr wrap="square" rtlCol="0" anchor="ctr">
+            <a:noAutofit/>
+          </a:bodyPr>
+          <a:lstStyle/>
+          <a:p>
+            <a:pPr algn="ctr"/>
+            <a:endParaRPr lang="en-US"/>
+          </a:p>
+        </p:txBody>
+      </p:sp>
+      <p:sp>
+        <p:nvSpPr>
+          <p:cNvPr id="31" name="Right Triangle 24">
+            <a:extLst>
+              <a:ext uri="{FF2B5EF4-FFF2-40B4-BE49-F238E27FC236}">
+                <a16:creationId xmlns:a16="http://schemas.microsoft.com/office/drawing/2014/main" id="{5298780A-33B9-4EA2-8F67-DE68AD62841B}"/>
+              </a:ext>
+              <a:ext uri="{C183D7F6-B498-43B3-948B-1728B52AA6E4}">
+                <adec:decorative xmlns:adec="http://schemas.microsoft.com/office/drawing/2017/decorative" val="1"/>
+              </a:ext>
+            </a:extLst>
+          </p:cNvPr>
+          <p:cNvSpPr>
+            <a:spLocks noGrp="1" noRot="1" noChangeAspect="1" noMove="1" noResize="1" noEditPoints="1" noAdjustHandles="1" noChangeArrowheads="1" noChangeShapeType="1" noTextEdit="1"/>
+          </p:cNvSpPr>
+          <p:nvPr>
+            <p:extLst>
+              <p:ext uri="{386F3935-93C4-4BCD-93E2-E3B085C9AB24}">
+                <p16:designElem xmlns:p16="http://schemas.microsoft.com/office/powerpoint/2015/main" val="1"/>
+              </p:ext>
+            </p:extLst>
+          </p:nvPr>
+        </p:nvSpPr>
+        <p:spPr>
+          <a:xfrm flipH="1">
+            <a:off x="8576720" y="3335867"/>
+            <a:ext cx="3291840" cy="3200400"/>
+          </a:xfrm>
+          <a:prstGeom prst="rtTriangle">
+            <a:avLst/>
+          </a:prstGeom>
+          <a:solidFill>
+            <a:schemeClr val="accent4"/>
+          </a:solidFill>
+          <a:ln>
+            <a:noFill/>
+          </a:ln>
+        </p:spPr>
+        <p:style>
+          <a:lnRef idx="2">
+            <a:schemeClr val="accent1">
+              <a:shade val="50000"/>
+            </a:schemeClr>
+          </a:lnRef>
+          <a:fillRef idx="1">
+            <a:schemeClr val="accent1"/>
+          </a:fillRef>
+          <a:effectRef idx="0">
+            <a:schemeClr val="accent1"/>
+          </a:effectRef>
+          <a:fontRef idx="minor">
+            <a:schemeClr val="lt1"/>
+          </a:fontRef>
+        </p:style>
+        <p:txBody>
+          <a:bodyPr rtlCol="0" anchor="ctr"/>
+          <a:lstStyle/>
+          <a:p>
+            <a:pPr algn="ctr"/>
+            <a:endParaRPr lang="en-US" dirty="0"/>
+          </a:p>
+        </p:txBody>
+      </p:sp>
+      <p:sp>
+        <p:nvSpPr>
+          <p:cNvPr id="27" name="Rectangle 26">
+            <a:extLst>
+              <a:ext uri="{FF2B5EF4-FFF2-40B4-BE49-F238E27FC236}">
+                <a16:creationId xmlns:a16="http://schemas.microsoft.com/office/drawing/2014/main" id="{7F488E8B-4E1E-4402-8935-D4E6C02615C7}"/>
+              </a:ext>
+              <a:ext uri="{C183D7F6-B498-43B3-948B-1728B52AA6E4}">
+                <adec:decorative xmlns:adec="http://schemas.microsoft.com/office/drawing/2017/decorative" val="1"/>
+              </a:ext>
+            </a:extLst>
+          </p:cNvPr>
+          <p:cNvSpPr>
+            <a:spLocks noGrp="1" noRot="1" noChangeAspect="1" noMove="1" noResize="1" noEditPoints="1" noAdjustHandles="1" noChangeArrowheads="1" noChangeShapeType="1" noTextEdit="1"/>
+          </p:cNvSpPr>
+          <p:nvPr>
+            <p:extLst>
+              <p:ext uri="{386F3935-93C4-4BCD-93E2-E3B085C9AB24}">
+                <p16:designElem xmlns:p16="http://schemas.microsoft.com/office/powerpoint/2015/main" val="1"/>
+              </p:ext>
+            </p:extLst>
+          </p:nvPr>
+        </p:nvSpPr>
+        <p:spPr>
+          <a:xfrm>
+            <a:off x="641774" y="623275"/>
+            <a:ext cx="10905053" cy="5607882"/>
+          </a:xfrm>
+          <a:prstGeom prst="rect">
+            <a:avLst/>
+          </a:prstGeom>
+          <a:noFill/>
+          <a:ln w="19050">
+            <a:noFill/>
+          </a:ln>
+        </p:spPr>
+        <p:style>
+          <a:lnRef idx="2">
+            <a:schemeClr val="accent1">
+              <a:shade val="50000"/>
+            </a:schemeClr>
+          </a:lnRef>
+          <a:fillRef idx="1">
+            <a:schemeClr val="accent1"/>
+          </a:fillRef>
+          <a:effectRef idx="0">
+            <a:schemeClr val="accent1"/>
+          </a:effectRef>
+          <a:fontRef idx="minor">
+            <a:schemeClr val="lt1"/>
+          </a:fontRef>
+        </p:style>
+        <p:txBody>
+          <a:bodyPr rtlCol="0" anchor="ctr"/>
+          <a:lstStyle/>
+          <a:p>
+            <a:pPr algn="ctr"/>
+            <a:endParaRPr lang="en-US"/>
+          </a:p>
+        </p:txBody>
+      </p:sp>
+      <p:sp>
+        <p:nvSpPr>
+          <p:cNvPr id="2" name="Titel 1">
+            <a:extLst>
+              <a:ext uri="{FF2B5EF4-FFF2-40B4-BE49-F238E27FC236}">
+                <a16:creationId xmlns:a16="http://schemas.microsoft.com/office/drawing/2014/main" id="{C01F638B-5FA5-401B-B579-514657733BC0}"/>
+              </a:ext>
+            </a:extLst>
+          </p:cNvPr>
+          <p:cNvSpPr>
+            <a:spLocks noGrp="1"/>
+          </p:cNvSpPr>
+          <p:nvPr>
+            <p:ph type="title"/>
+          </p:nvPr>
+        </p:nvSpPr>
+        <p:spPr>
+          <a:xfrm>
+            <a:off x="1006900" y="1188637"/>
+            <a:ext cx="3141430" cy="4480726"/>
+          </a:xfrm>
+        </p:spPr>
+        <p:txBody>
+          <a:bodyPr>
+            <a:normAutofit/>
+          </a:bodyPr>
+          <a:lstStyle/>
+          <a:p>
+            <a:pPr algn="r"/>
+            <a:r>
+              <a:rPr lang="de-AT" sz="5100" dirty="0"/>
+              <a:t>Open Problems</a:t>
+            </a:r>
+            <a:br>
+              <a:rPr lang="de-AT" sz="5100" dirty="0"/>
+            </a:br>
+            <a:r>
+              <a:rPr lang="de-AT" sz="5100" dirty="0"/>
+              <a:t>And</a:t>
+            </a:r>
+            <a:br>
+              <a:rPr lang="de-AT" sz="5100" dirty="0"/>
+            </a:br>
+            <a:r>
+              <a:rPr lang="de-AT" sz="5100" dirty="0"/>
+              <a:t>Challenges</a:t>
+            </a:r>
+          </a:p>
+        </p:txBody>
+      </p:sp>
+      <p:cxnSp>
+        <p:nvCxnSpPr>
+          <p:cNvPr id="29" name="Straight Connector 28">
+            <a:extLst>
+              <a:ext uri="{FF2B5EF4-FFF2-40B4-BE49-F238E27FC236}">
+                <a16:creationId xmlns:a16="http://schemas.microsoft.com/office/drawing/2014/main" id="{23AAC9B5-8015-485C-ACF9-A750390E9A56}"/>
+              </a:ext>
+              <a:ext uri="{C183D7F6-B498-43B3-948B-1728B52AA6E4}">
+                <adec:decorative xmlns:adec="http://schemas.microsoft.com/office/drawing/2017/decorative" val="1"/>
+              </a:ext>
+            </a:extLst>
+          </p:cNvPr>
+          <p:cNvCxnSpPr>
+            <a:cxnSpLocks noGrp="1" noRot="1" noChangeAspect="1" noMove="1" noResize="1" noEditPoints="1" noAdjustHandles="1" noChangeArrowheads="1" noChangeShapeType="1"/>
+          </p:cNvCxnSpPr>
+          <p:nvPr>
+            <p:extLst>
+              <p:ext uri="{386F3935-93C4-4BCD-93E2-E3B085C9AB24}">
+                <p16:designElem xmlns:p16="http://schemas.microsoft.com/office/powerpoint/2015/main" val="1"/>
+              </p:ext>
+            </p:extLst>
+          </p:nvPr>
+        </p:nvCxnSpPr>
+        <p:spPr>
+          <a:xfrm>
+            <a:off x="4654296" y="1852863"/>
+            <a:ext cx="0" cy="3236495"/>
+          </a:xfrm>
+          <a:prstGeom prst="line">
+            <a:avLst/>
+          </a:prstGeom>
+          <a:ln w="19050" cap="sq">
+            <a:solidFill>
+              <a:schemeClr val="tx1">
+                <a:lumMod val="75000"/>
+                <a:lumOff val="25000"/>
+              </a:schemeClr>
+            </a:solidFill>
+          </a:ln>
+        </p:spPr>
+        <p:style>
+          <a:lnRef idx="1">
+            <a:schemeClr val="accent1"/>
+          </a:lnRef>
+          <a:fillRef idx="0">
+            <a:schemeClr val="accent1"/>
+          </a:fillRef>
+          <a:effectRef idx="0">
+            <a:schemeClr val="accent1"/>
+          </a:effectRef>
+          <a:fontRef idx="minor">
+            <a:schemeClr val="tx1"/>
+          </a:fontRef>
+        </p:style>
+      </p:cxnSp>
+      <p:sp>
+        <p:nvSpPr>
+          <p:cNvPr id="3" name="Inhaltsplatzhalter 2">
+            <a:extLst>
+              <a:ext uri="{FF2B5EF4-FFF2-40B4-BE49-F238E27FC236}">
+                <a16:creationId xmlns:a16="http://schemas.microsoft.com/office/drawing/2014/main" id="{8FF0E0A1-E8BF-46CD-BD68-63DB967E5D5D}"/>
+              </a:ext>
+            </a:extLst>
+          </p:cNvPr>
+          <p:cNvSpPr>
+            <a:spLocks noGrp="1"/>
+          </p:cNvSpPr>
+          <p:nvPr>
+            <p:ph idx="1"/>
+          </p:nvPr>
+        </p:nvSpPr>
+        <p:spPr>
+          <a:xfrm>
+            <a:off x="5138928" y="1338729"/>
+            <a:ext cx="4795584" cy="4180542"/>
+          </a:xfrm>
+        </p:spPr>
+        <p:txBody>
+          <a:bodyPr anchor="ctr">
+            <a:normAutofit/>
+          </a:bodyPr>
+          <a:lstStyle/>
+          <a:p>
+            <a:r>
+              <a:rPr lang="de-AT" sz="2200"/>
+              <a:t>Model relationships and all relevant aspects</a:t>
+            </a:r>
           </a:p>
           <a:p>
             <a:pPr lvl="1"/>
             <a:r>
-              <a:rPr lang="de-AT" dirty="0"/>
-              <a:t>Much </a:t>
-            </a:r>
-            <a:r>
-              <a:rPr lang="de-AT" dirty="0" err="1"/>
-              <a:t>research</a:t>
-            </a:r>
-            <a:r>
-              <a:rPr lang="de-AT" dirty="0"/>
-              <a:t> just </a:t>
-            </a:r>
-            <a:r>
-              <a:rPr lang="de-AT" dirty="0" err="1"/>
-              <a:t>does</a:t>
-            </a:r>
-            <a:r>
-              <a:rPr lang="de-AT" dirty="0"/>
-              <a:t> quantitative </a:t>
-            </a:r>
-            <a:r>
-              <a:rPr lang="de-AT" dirty="0" err="1"/>
-              <a:t>analysis</a:t>
-            </a:r>
-            <a:r>
-              <a:rPr lang="de-AT" dirty="0"/>
-              <a:t> </a:t>
-            </a:r>
-          </a:p>
-          <a:p>
-            <a:r>
-              <a:rPr lang="de-AT" dirty="0"/>
-              <a:t>Handle </a:t>
-            </a:r>
-            <a:r>
-              <a:rPr lang="de-AT" dirty="0" err="1"/>
-              <a:t>big</a:t>
-            </a:r>
-            <a:r>
-              <a:rPr lang="de-AT" dirty="0"/>
-              <a:t> </a:t>
-            </a:r>
-            <a:r>
-              <a:rPr lang="de-AT" dirty="0" err="1"/>
-              <a:t>data</a:t>
-            </a:r>
-            <a:r>
-              <a:rPr lang="de-AT" dirty="0"/>
-              <a:t> </a:t>
-            </a:r>
-          </a:p>
-          <a:p>
-            <a:r>
-              <a:rPr lang="de-AT" dirty="0" err="1"/>
-              <a:t>Inference</a:t>
-            </a:r>
-            <a:r>
-              <a:rPr lang="de-AT" dirty="0"/>
-              <a:t> </a:t>
-            </a:r>
-            <a:r>
-              <a:rPr lang="de-AT" dirty="0" err="1"/>
-              <a:t>times</a:t>
-            </a:r>
-            <a:endParaRPr lang="de-AT" dirty="0"/>
-          </a:p>
-          <a:p>
-            <a:r>
-              <a:rPr lang="de-AT" dirty="0"/>
-              <a:t>Fast </a:t>
-            </a:r>
-            <a:r>
-              <a:rPr lang="de-AT" dirty="0" err="1"/>
-              <a:t>paced</a:t>
-            </a:r>
-            <a:r>
-              <a:rPr lang="de-AT" dirty="0"/>
-              <a:t> </a:t>
-            </a:r>
-            <a:r>
-              <a:rPr lang="de-AT" dirty="0" err="1"/>
-              <a:t>field</a:t>
-            </a:r>
-            <a:r>
-              <a:rPr lang="de-AT" dirty="0"/>
-              <a:t> </a:t>
-            </a:r>
-          </a:p>
-          <a:p>
-            <a:r>
-              <a:rPr lang="de-AT"/>
-              <a:t>Spotify NGA</a:t>
-            </a:r>
-            <a:endParaRPr lang="de-AT" dirty="0"/>
+              <a:rPr lang="de-AT" sz="2200"/>
+              <a:t>What is relevant? What is redundant information?</a:t>
+            </a:r>
+          </a:p>
+          <a:p>
+            <a:r>
+              <a:rPr lang="de-AT" sz="2200"/>
+              <a:t>User‘s satisfaction</a:t>
+            </a:r>
           </a:p>
           <a:p>
             <a:pPr lvl="1"/>
-            <a:endParaRPr lang="de-AT" dirty="0"/>
+            <a:r>
+              <a:rPr lang="de-AT" sz="2200"/>
+              <a:t>Much research just does quantitative analysis </a:t>
+            </a:r>
+          </a:p>
+          <a:p>
+            <a:r>
+              <a:rPr lang="de-AT" sz="2200"/>
+              <a:t>Handle big data </a:t>
+            </a:r>
+          </a:p>
+          <a:p>
+            <a:r>
+              <a:rPr lang="de-AT" sz="2200"/>
+              <a:t>Inference times</a:t>
+            </a:r>
+          </a:p>
+          <a:p>
+            <a:r>
+              <a:rPr lang="de-AT" sz="2200"/>
+              <a:t>Fast paced field </a:t>
+            </a:r>
+          </a:p>
+          <a:p>
+            <a:r>
+              <a:rPr lang="de-AT" sz="2200"/>
+              <a:t>NGA</a:t>
+            </a:r>
+          </a:p>
+          <a:p>
+            <a:pPr lvl="1"/>
+            <a:endParaRPr lang="de-AT" sz="2200" dirty="0"/>
           </a:p>
         </p:txBody>
       </p:sp>

</xml_diff>